<commit_message>
add demo safety slides
</commit_message>
<xml_diff>
--- a/BP301 - An introduction to working with the Activity Stream.pptx
+++ b/BP301 - An introduction to working with the Activity Stream.pptx
@@ -5,10 +5,10 @@
     <p:sldMasterId id="2147483652" r:id="rId1"/>
   </p:sldMasterIdLst>
   <p:notesMasterIdLst>
-    <p:notesMasterId r:id="rId62"/>
+    <p:notesMasterId r:id="rId65"/>
   </p:notesMasterIdLst>
   <p:handoutMasterIdLst>
-    <p:handoutMasterId r:id="rId63"/>
+    <p:handoutMasterId r:id="rId66"/>
   </p:handoutMasterIdLst>
   <p:sldIdLst>
     <p:sldId id="256" r:id="rId2"/>
@@ -67,10 +67,13 @@
     <p:sldId id="361" r:id="rId55"/>
     <p:sldId id="362" r:id="rId56"/>
     <p:sldId id="363" r:id="rId57"/>
-    <p:sldId id="364" r:id="rId58"/>
-    <p:sldId id="365" r:id="rId59"/>
-    <p:sldId id="366" r:id="rId60"/>
-    <p:sldId id="367" r:id="rId61"/>
+    <p:sldId id="375" r:id="rId58"/>
+    <p:sldId id="376" r:id="rId59"/>
+    <p:sldId id="377" r:id="rId60"/>
+    <p:sldId id="364" r:id="rId61"/>
+    <p:sldId id="365" r:id="rId62"/>
+    <p:sldId id="366" r:id="rId63"/>
+    <p:sldId id="367" r:id="rId64"/>
   </p:sldIdLst>
   <p:sldSz cx="9144000" cy="5148263"/>
   <p:notesSz cx="6858000" cy="9144000"/>
@@ -1537,7 +1540,7 @@
             <a:fld id="{24EEF2A3-E7B0-8244-9AF4-F3FAD0EC40FA}" type="datetime3">
               <a:rPr lang="en-US"/>
               <a:pPr/>
-              <a:t>22 januar 2014</a:t>
+              <a:t>24 januar 2014</a:t>
             </a:fld>
             <a:endParaRPr lang="en-US"/>
           </a:p>
@@ -1743,7 +1746,7 @@
             <a:fld id="{6ED2850B-64FA-6C4F-B83E-4D24232FD1FA}" type="datetime3">
               <a:rPr lang="en-US"/>
               <a:pPr/>
-              <a:t>22 januar 2014</a:t>
+              <a:t>24 januar 2014</a:t>
             </a:fld>
             <a:endParaRPr lang="en-US"/>
           </a:p>
@@ -1922,7 +1925,7 @@
             <a:fld id="{67070594-C552-4374-AD83-923BA7AF334B}" type="datetimeFigureOut">
               <a:rPr lang="es-ES" smtClean="0"/>
               <a:pPr/>
-              <a:t>22/01/14</a:t>
+              <a:t>24/01/14</a:t>
             </a:fld>
             <a:endParaRPr lang="es-ES"/>
           </a:p>
@@ -2540,7 +2543,7 @@
             <a:fld id="{047785FB-7138-CC49-B141-75CCA79FAC1D}" type="datetime3">
               <a:rPr lang="en-US"/>
               <a:pPr/>
-              <a:t>22 januar 2014</a:t>
+              <a:t>24 januar 2014</a:t>
             </a:fld>
             <a:endParaRPr lang="en-US"/>
           </a:p>
@@ -2854,7 +2857,7 @@
             <a:fld id="{AFEBFF44-355B-AF4A-8912-1CA5BDF894DA}" type="datetime3">
               <a:rPr lang="en-US"/>
               <a:pPr/>
-              <a:t>22 januar 2014</a:t>
+              <a:t>24 januar 2014</a:t>
             </a:fld>
             <a:endParaRPr lang="en-US"/>
           </a:p>
@@ -3307,7 +3310,7 @@
             <a:fld id="{2343BAAB-1A4D-4E4C-95EF-40D9741C0BA4}" type="datetime3">
               <a:rPr lang="en-US"/>
               <a:pPr/>
-              <a:t>22 januar 2014</a:t>
+              <a:t>24 januar 2014</a:t>
             </a:fld>
             <a:endParaRPr lang="en-US"/>
           </a:p>
@@ -3451,7 +3454,7 @@
             <a:fld id="{C909C00D-AB2E-744B-829D-B37BCA60CD18}" type="datetime3">
               <a:rPr lang="en-US"/>
               <a:pPr/>
-              <a:t>22 januar 2014</a:t>
+              <a:t>24 januar 2014</a:t>
             </a:fld>
             <a:endParaRPr lang="en-US"/>
           </a:p>
@@ -3572,7 +3575,7 @@
             <a:fld id="{87BBECD9-8A60-FE40-B182-1E0106BC02C3}" type="datetime3">
               <a:rPr lang="en-US"/>
               <a:pPr/>
-              <a:t>22 januar 2014</a:t>
+              <a:t>24 januar 2014</a:t>
             </a:fld>
             <a:endParaRPr lang="en-US"/>
           </a:p>
@@ -3875,7 +3878,7 @@
             <a:fld id="{A0A98DBD-078B-EA4C-A92B-64BB8C1759FD}" type="datetime3">
               <a:rPr lang="en-US"/>
               <a:pPr/>
-              <a:t>22 januar 2014</a:t>
+              <a:t>24 januar 2014</a:t>
             </a:fld>
             <a:endParaRPr lang="en-US"/>
           </a:p>
@@ -4158,7 +4161,7 @@
             <a:fld id="{C06ED125-AAAA-2340-A0AB-413D51919A95}" type="datetime3">
               <a:rPr lang="en-US"/>
               <a:pPr/>
-              <a:t>22 januar 2014</a:t>
+              <a:t>24 januar 2014</a:t>
             </a:fld>
             <a:endParaRPr lang="en-US"/>
           </a:p>
@@ -4337,7 +4340,7 @@
             <a:fld id="{AD191BBB-6C70-D44D-98AA-1CB34EFFA635}" type="datetime3">
               <a:rPr lang="en-US"/>
               <a:pPr/>
-              <a:t>22 januar 2014</a:t>
+              <a:t>24 januar 2014</a:t>
             </a:fld>
             <a:endParaRPr lang="en-US"/>
           </a:p>
@@ -11791,23 +11794,7 @@
                   <a:schemeClr val="bg1"/>
                 </a:solidFill>
               </a:rPr>
-              <a:t>		</a:t>
-            </a:r>
-            <a:r>
-              <a:rPr lang="da-DK" sz="1600" dirty="0" smtClean="0">
-                <a:solidFill>
-                  <a:schemeClr val="bg1"/>
-                </a:solidFill>
-              </a:rPr>
-              <a:t>	"</a:t>
-            </a:r>
-            <a:r>
-              <a:rPr lang="da-DK" sz="1600" dirty="0" smtClean="0">
-                <a:solidFill>
-                  <a:schemeClr val="bg1"/>
-                </a:solidFill>
-              </a:rPr>
-              <a:t>title": "Some </a:t>
+              <a:t>			"title": "Some </a:t>
             </a:r>
             <a:r>
               <a:rPr lang="da-DK" sz="1600" dirty="0" err="1" smtClean="0">
@@ -11854,23 +11841,7 @@
                   <a:schemeClr val="bg1"/>
                 </a:solidFill>
               </a:rPr>
-              <a:t>	</a:t>
-            </a:r>
-            <a:r>
-              <a:rPr lang="da-DK" sz="1600" dirty="0" smtClean="0">
-                <a:solidFill>
-                  <a:schemeClr val="bg1"/>
-                </a:solidFill>
-              </a:rPr>
-              <a:t>	</a:t>
-            </a:r>
-            <a:r>
-              <a:rPr lang="da-DK" sz="1600" dirty="0" smtClean="0">
-                <a:solidFill>
-                  <a:schemeClr val="bg1"/>
-                </a:solidFill>
-              </a:rPr>
-              <a:t>	"objectType": "note”,</a:t>
+              <a:t>			"objectType": "note”,</a:t>
             </a:r>
             <a:br>
               <a:rPr lang="da-DK" sz="1600" dirty="0" smtClean="0">
@@ -11885,23 +11856,7 @@
                   <a:schemeClr val="bg1"/>
                 </a:solidFill>
               </a:rPr>
-              <a:t>	</a:t>
-            </a:r>
-            <a:r>
-              <a:rPr lang="da-DK" sz="1600" dirty="0" smtClean="0">
-                <a:solidFill>
-                  <a:schemeClr val="bg1"/>
-                </a:solidFill>
-              </a:rPr>
-              <a:t>	</a:t>
-            </a:r>
-            <a:r>
-              <a:rPr lang="da-DK" sz="1600" dirty="0" smtClean="0">
-                <a:solidFill>
-                  <a:schemeClr val="bg1"/>
-                </a:solidFill>
-              </a:rPr>
-              <a:t>	"id": "1234567890-1234567890-1234567890”</a:t>
+              <a:t>			"id": "1234567890-1234567890-1234567890”</a:t>
             </a:r>
             <a:br>
               <a:rPr lang="da-DK" sz="1600" dirty="0" smtClean="0">
@@ -15528,6 +15483,13 @@
   <p:clrMapOvr>
     <a:masterClrMapping/>
   </p:clrMapOvr>
+  <p:timing>
+    <p:tnLst>
+      <p:par>
+        <p:cTn xmlns:p14="http://schemas.microsoft.com/office/powerpoint/2010/main" id="1" dur="indefinite" restart="never" nodeType="tmRoot"/>
+      </p:par>
+    </p:tnLst>
+  </p:timing>
 </p:sld>
 </file>
 
@@ -15780,15 +15742,7 @@
             <a:pPr lvl="1"/>
             <a:r>
               <a:rPr lang="da-DK" dirty="0" smtClean="0"/>
-              <a:t>${created} 	</a:t>
-            </a:r>
-            <a:r>
-              <a:rPr lang="da-DK" dirty="0" smtClean="0"/>
-              <a:t>	= </a:t>
-            </a:r>
-            <a:r>
-              <a:rPr lang="da-DK" dirty="0" smtClean="0"/>
-              <a:t>${Actor} created ${Object}</a:t>
+              <a:t>${created} 		= ${Actor} created ${Object}</a:t>
             </a:r>
           </a:p>
           <a:p>
@@ -16107,14 +16061,6 @@
               </a:rPr>
               <a:t>{</a:t>
             </a:r>
-            <a:r>
-              <a:rPr lang="da-DK" sz="1600" dirty="0" smtClean="0">
-                <a:solidFill>
-                  <a:schemeClr val="bg1"/>
-                </a:solidFill>
-              </a:rPr>
-              <a:t/>
-            </a:r>
             <a:br>
               <a:rPr lang="da-DK" sz="1600" dirty="0" smtClean="0">
                 <a:solidFill>
@@ -17708,14 +17654,6 @@
                 </a:solidFill>
               </a:rPr>
               <a:t>{</a:t>
-            </a:r>
-            <a:r>
-              <a:rPr lang="da-DK" sz="1600" dirty="0" smtClean="0">
-                <a:solidFill>
-                  <a:schemeClr val="bg1"/>
-                </a:solidFill>
-              </a:rPr>
-              <a:t/>
             </a:r>
             <a:br>
               <a:rPr lang="da-DK" sz="1600" dirty="0" smtClean="0">
@@ -19182,15 +19120,7 @@
                   <a:schemeClr val="bg1"/>
                 </a:solidFill>
               </a:rPr>
-              <a:t> Group Calendar"</a:t>
-            </a:r>
-            <a:r>
-              <a:rPr lang="da-DK" sz="1600" dirty="0" smtClean="0">
-                <a:solidFill>
-                  <a:schemeClr val="bg1"/>
-                </a:solidFill>
-              </a:rPr>
-              <a:t>, </a:t>
+              <a:t> Group Calendar", </a:t>
             </a:r>
             <a:br>
               <a:rPr lang="da-DK" sz="1600" dirty="0" smtClean="0">
@@ -19237,7 +19167,15 @@
                   <a:schemeClr val="bg1"/>
                 </a:solidFill>
               </a:rPr>
-              <a:t>: </a:t>
+              <a:t>: "http://</a:t>
+            </a:r>
+            <a:r>
+              <a:rPr lang="da-DK" sz="1600" dirty="0" err="1" smtClean="0">
+                <a:solidFill>
+                  <a:schemeClr val="bg1"/>
+                </a:solidFill>
+              </a:rPr>
+              <a:t>www.ontimesuite.com</a:t>
             </a:r>
             <a:r>
               <a:rPr lang="da-DK" sz="1600" dirty="0" smtClean="0">
@@ -19247,13 +19185,110 @@
               </a:rPr>
               <a:t>"</a:t>
             </a:r>
-            <a:r>
-              <a:rPr lang="da-DK" sz="1600" dirty="0" smtClean="0">
-                <a:solidFill>
-                  <a:schemeClr val="bg1"/>
-                </a:solidFill>
-              </a:rPr>
-              <a:t>http://</a:t>
+            <a:br>
+              <a:rPr lang="da-DK" sz="1600" dirty="0" smtClean="0">
+                <a:solidFill>
+                  <a:schemeClr val="bg1"/>
+                </a:solidFill>
+              </a:rPr>
+            </a:br>
+            <a:r>
+              <a:rPr lang="da-DK" sz="1600" dirty="0" smtClean="0">
+                <a:solidFill>
+                  <a:schemeClr val="bg1"/>
+                </a:solidFill>
+              </a:rPr>
+              <a:t>	},</a:t>
+            </a:r>
+            <a:br>
+              <a:rPr lang="da-DK" sz="1600" dirty="0" smtClean="0">
+                <a:solidFill>
+                  <a:schemeClr val="bg1"/>
+                </a:solidFill>
+              </a:rPr>
+            </a:br>
+            <a:r>
+              <a:rPr lang="da-DK" sz="1600" dirty="0" smtClean="0">
+                <a:solidFill>
+                  <a:schemeClr val="bg1"/>
+                </a:solidFill>
+              </a:rPr>
+              <a:t>	"actor": {"id": "@me"},</a:t>
+            </a:r>
+            <a:br>
+              <a:rPr lang="da-DK" sz="1600" dirty="0" smtClean="0">
+                <a:solidFill>
+                  <a:schemeClr val="bg1"/>
+                </a:solidFill>
+              </a:rPr>
+            </a:br>
+            <a:r>
+              <a:rPr lang="da-DK" sz="1600" dirty="0" smtClean="0">
+                <a:solidFill>
+                  <a:schemeClr val="bg1"/>
+                </a:solidFill>
+              </a:rPr>
+              <a:t>	"verb": "post”,</a:t>
+            </a:r>
+            <a:br>
+              <a:rPr lang="da-DK" sz="1600" dirty="0" smtClean="0">
+                <a:solidFill>
+                  <a:schemeClr val="bg1"/>
+                </a:solidFill>
+              </a:rPr>
+            </a:br>
+            <a:r>
+              <a:rPr lang="da-DK" sz="1600" dirty="0" smtClean="0">
+                <a:solidFill>
+                  <a:schemeClr val="bg1"/>
+                </a:solidFill>
+              </a:rPr>
+              <a:t>	"title": "Some entry title", </a:t>
+            </a:r>
+            <a:br>
+              <a:rPr lang="da-DK" sz="1600" dirty="0" smtClean="0">
+                <a:solidFill>
+                  <a:schemeClr val="bg1"/>
+                </a:solidFill>
+              </a:rPr>
+            </a:br>
+            <a:r>
+              <a:rPr lang="da-DK" sz="1600" dirty="0" smtClean="0">
+                <a:solidFill>
+                  <a:schemeClr val="bg1"/>
+                </a:solidFill>
+              </a:rPr>
+              <a:t>	"updated": "2013-05-17T12:00:00.000Z”,</a:t>
+            </a:r>
+            <a:br>
+              <a:rPr lang="da-DK" sz="1600" dirty="0" smtClean="0">
+                <a:solidFill>
+                  <a:schemeClr val="bg1"/>
+                </a:solidFill>
+              </a:rPr>
+            </a:br>
+            <a:r>
+              <a:rPr lang="da-DK" sz="1600" dirty="0" smtClean="0">
+                <a:solidFill>
+                  <a:schemeClr val="bg1"/>
+                </a:solidFill>
+              </a:rPr>
+              <a:t>	"object": {</a:t>
+            </a:r>
+            <a:br>
+              <a:rPr lang="da-DK" sz="1600" dirty="0" smtClean="0">
+                <a:solidFill>
+                  <a:schemeClr val="bg1"/>
+                </a:solidFill>
+              </a:rPr>
+            </a:br>
+            <a:r>
+              <a:rPr lang="da-DK" sz="1600" dirty="0" smtClean="0">
+                <a:solidFill>
+                  <a:schemeClr val="bg1"/>
+                </a:solidFill>
+              </a:rPr>
+              <a:t>			"title": "Some </a:t>
             </a:r>
             <a:r>
               <a:rPr lang="da-DK" sz="1600" dirty="0" err="1" smtClean="0">
@@ -19261,15 +19296,31 @@
                   <a:schemeClr val="bg1"/>
                 </a:solidFill>
               </a:rPr>
-              <a:t>www.ontimesuite.com</a:t>
-            </a:r>
-            <a:r>
-              <a:rPr lang="da-DK" sz="1600" dirty="0" smtClean="0">
-                <a:solidFill>
-                  <a:schemeClr val="bg1"/>
-                </a:solidFill>
-              </a:rPr>
-              <a:t>"</a:t>
+              <a:t>object</a:t>
+            </a:r>
+            <a:r>
+              <a:rPr lang="da-DK" sz="1600" dirty="0" smtClean="0">
+                <a:solidFill>
+                  <a:schemeClr val="bg1"/>
+                </a:solidFill>
+              </a:rPr>
+              <a:t> </a:t>
+            </a:r>
+            <a:r>
+              <a:rPr lang="da-DK" sz="1600" dirty="0" err="1" smtClean="0">
+                <a:solidFill>
+                  <a:schemeClr val="bg1"/>
+                </a:solidFill>
+              </a:rPr>
+              <a:t>title</a:t>
+            </a:r>
+            <a:r>
+              <a:rPr lang="da-DK" sz="1600" dirty="0" smtClean="0">
+                <a:solidFill>
+                  <a:schemeClr val="bg1"/>
+                </a:solidFill>
+              </a:rPr>
+              <a:t>”,</a:t>
             </a:r>
             <a:br>
               <a:rPr lang="da-DK" sz="1600" dirty="0" smtClean="0">
@@ -19284,15 +19335,7 @@
                   <a:schemeClr val="bg1"/>
                 </a:solidFill>
               </a:rPr>
-              <a:t>	},</a:t>
-            </a:r>
-            <a:r>
-              <a:rPr lang="da-DK" sz="1600" dirty="0" smtClean="0">
-                <a:solidFill>
-                  <a:schemeClr val="bg1"/>
-                </a:solidFill>
-              </a:rPr>
-              <a:t/>
+              <a:t>			"objectType": "note”,</a:t>
             </a:r>
             <a:br>
               <a:rPr lang="da-DK" sz="1600" dirty="0" smtClean="0">
@@ -19307,192 +19350,7 @@
                   <a:schemeClr val="bg1"/>
                 </a:solidFill>
               </a:rPr>
-              <a:t>	"actor": {"id": "@me"},</a:t>
-            </a:r>
-            <a:br>
-              <a:rPr lang="da-DK" sz="1600" dirty="0" smtClean="0">
-                <a:solidFill>
-                  <a:schemeClr val="bg1"/>
-                </a:solidFill>
-              </a:rPr>
-            </a:br>
-            <a:r>
-              <a:rPr lang="da-DK" sz="1600" dirty="0" smtClean="0">
-                <a:solidFill>
-                  <a:schemeClr val="bg1"/>
-                </a:solidFill>
-              </a:rPr>
-              <a:t>	"verb": "post”,</a:t>
-            </a:r>
-            <a:br>
-              <a:rPr lang="da-DK" sz="1600" dirty="0" smtClean="0">
-                <a:solidFill>
-                  <a:schemeClr val="bg1"/>
-                </a:solidFill>
-              </a:rPr>
-            </a:br>
-            <a:r>
-              <a:rPr lang="da-DK" sz="1600" dirty="0" smtClean="0">
-                <a:solidFill>
-                  <a:schemeClr val="bg1"/>
-                </a:solidFill>
-              </a:rPr>
-              <a:t>	"title": "Some entry title", </a:t>
-            </a:r>
-            <a:br>
-              <a:rPr lang="da-DK" sz="1600" dirty="0" smtClean="0">
-                <a:solidFill>
-                  <a:schemeClr val="bg1"/>
-                </a:solidFill>
-              </a:rPr>
-            </a:br>
-            <a:r>
-              <a:rPr lang="da-DK" sz="1600" dirty="0" smtClean="0">
-                <a:solidFill>
-                  <a:schemeClr val="bg1"/>
-                </a:solidFill>
-              </a:rPr>
-              <a:t>	"updated": "2013-05-17T12:00:00.000Z”,</a:t>
-            </a:r>
-            <a:br>
-              <a:rPr lang="da-DK" sz="1600" dirty="0" smtClean="0">
-                <a:solidFill>
-                  <a:schemeClr val="bg1"/>
-                </a:solidFill>
-              </a:rPr>
-            </a:br>
-            <a:r>
-              <a:rPr lang="da-DK" sz="1600" dirty="0" smtClean="0">
-                <a:solidFill>
-                  <a:schemeClr val="bg1"/>
-                </a:solidFill>
-              </a:rPr>
-              <a:t>	"object": {</a:t>
-            </a:r>
-            <a:br>
-              <a:rPr lang="da-DK" sz="1600" dirty="0" smtClean="0">
-                <a:solidFill>
-                  <a:schemeClr val="bg1"/>
-                </a:solidFill>
-              </a:rPr>
-            </a:br>
-            <a:r>
-              <a:rPr lang="da-DK" sz="1600" dirty="0" smtClean="0">
-                <a:solidFill>
-                  <a:schemeClr val="bg1"/>
-                </a:solidFill>
-              </a:rPr>
-              <a:t>		</a:t>
-            </a:r>
-            <a:r>
-              <a:rPr lang="da-DK" sz="1600" dirty="0" smtClean="0">
-                <a:solidFill>
-                  <a:schemeClr val="bg1"/>
-                </a:solidFill>
-              </a:rPr>
-              <a:t>	"</a:t>
-            </a:r>
-            <a:r>
-              <a:rPr lang="da-DK" sz="1600" dirty="0" smtClean="0">
-                <a:solidFill>
-                  <a:schemeClr val="bg1"/>
-                </a:solidFill>
-              </a:rPr>
-              <a:t>title": "Some </a:t>
-            </a:r>
-            <a:r>
-              <a:rPr lang="da-DK" sz="1600" dirty="0" err="1" smtClean="0">
-                <a:solidFill>
-                  <a:schemeClr val="bg1"/>
-                </a:solidFill>
-              </a:rPr>
-              <a:t>object</a:t>
-            </a:r>
-            <a:r>
-              <a:rPr lang="da-DK" sz="1600" dirty="0" smtClean="0">
-                <a:solidFill>
-                  <a:schemeClr val="bg1"/>
-                </a:solidFill>
-              </a:rPr>
-              <a:t> </a:t>
-            </a:r>
-            <a:r>
-              <a:rPr lang="da-DK" sz="1600" dirty="0" err="1" smtClean="0">
-                <a:solidFill>
-                  <a:schemeClr val="bg1"/>
-                </a:solidFill>
-              </a:rPr>
-              <a:t>title</a:t>
-            </a:r>
-            <a:r>
-              <a:rPr lang="da-DK" sz="1600" dirty="0" smtClean="0">
-                <a:solidFill>
-                  <a:schemeClr val="bg1"/>
-                </a:solidFill>
-              </a:rPr>
-              <a:t>”,</a:t>
-            </a:r>
-            <a:br>
-              <a:rPr lang="da-DK" sz="1600" dirty="0" smtClean="0">
-                <a:solidFill>
-                  <a:schemeClr val="bg1"/>
-                </a:solidFill>
-              </a:rPr>
-            </a:br>
-            <a:r>
-              <a:rPr lang="da-DK" sz="1600" dirty="0" smtClean="0">
-                <a:solidFill>
-                  <a:schemeClr val="bg1"/>
-                </a:solidFill>
-              </a:rPr>
-              <a:t>		</a:t>
-            </a:r>
-            <a:r>
-              <a:rPr lang="da-DK" sz="1600" dirty="0" smtClean="0">
-                <a:solidFill>
-                  <a:schemeClr val="bg1"/>
-                </a:solidFill>
-              </a:rPr>
-              <a:t>	"</a:t>
-            </a:r>
-            <a:r>
-              <a:rPr lang="da-DK" sz="1600" dirty="0" smtClean="0">
-                <a:solidFill>
-                  <a:schemeClr val="bg1"/>
-                </a:solidFill>
-              </a:rPr>
-              <a:t>objectType": "note”,</a:t>
-            </a:r>
-            <a:br>
-              <a:rPr lang="da-DK" sz="1600" dirty="0" smtClean="0">
-                <a:solidFill>
-                  <a:schemeClr val="bg1"/>
-                </a:solidFill>
-              </a:rPr>
-            </a:br>
-            <a:r>
-              <a:rPr lang="da-DK" sz="1600" dirty="0" smtClean="0">
-                <a:solidFill>
-                  <a:schemeClr val="bg1"/>
-                </a:solidFill>
-              </a:rPr>
-              <a:t>		</a:t>
-            </a:r>
-            <a:r>
-              <a:rPr lang="da-DK" sz="1600" dirty="0" smtClean="0">
-                <a:solidFill>
-                  <a:schemeClr val="bg1"/>
-                </a:solidFill>
-              </a:rPr>
-              <a:t>	"</a:t>
-            </a:r>
-            <a:r>
-              <a:rPr lang="da-DK" sz="1600" dirty="0" smtClean="0">
-                <a:solidFill>
-                  <a:schemeClr val="bg1"/>
-                </a:solidFill>
-              </a:rPr>
-              <a:t>id": "1234567890-1234567890-1234567890”</a:t>
+              <a:t>			"id": "1234567890-1234567890-1234567890”</a:t>
             </a:r>
             <a:br>
               <a:rPr lang="da-DK" sz="1600" dirty="0" smtClean="0">
@@ -19750,14 +19608,6 @@
               </a:rPr>
               <a:t>,</a:t>
             </a:r>
-            <a:r>
-              <a:rPr lang="da-DK" sz="1600" dirty="0" smtClean="0">
-                <a:solidFill>
-                  <a:schemeClr val="bg1"/>
-                </a:solidFill>
-              </a:rPr>
-              <a:t/>
-            </a:r>
             <a:br>
               <a:rPr lang="da-DK" sz="1600" dirty="0" smtClean="0">
                 <a:solidFill>
@@ -19846,23 +19696,7 @@
                   <a:schemeClr val="bg1"/>
                 </a:solidFill>
               </a:rPr>
-              <a:t>		</a:t>
-            </a:r>
-            <a:r>
-              <a:rPr lang="da-DK" sz="1600" dirty="0" smtClean="0">
-                <a:solidFill>
-                  <a:schemeClr val="bg1"/>
-                </a:solidFill>
-              </a:rPr>
-              <a:t>	"</a:t>
-            </a:r>
-            <a:r>
-              <a:rPr lang="da-DK" sz="1600" dirty="0" smtClean="0">
-                <a:solidFill>
-                  <a:schemeClr val="bg1"/>
-                </a:solidFill>
-              </a:rPr>
-              <a:t>title": "Some </a:t>
+              <a:t>			"title": "Some </a:t>
             </a:r>
             <a:r>
               <a:rPr lang="da-DK" sz="1600" dirty="0" err="1" smtClean="0">
@@ -19909,23 +19743,7 @@
                   <a:schemeClr val="bg1"/>
                 </a:solidFill>
               </a:rPr>
-              <a:t>		</a:t>
-            </a:r>
-            <a:r>
-              <a:rPr lang="da-DK" sz="1600" dirty="0" smtClean="0">
-                <a:solidFill>
-                  <a:schemeClr val="bg1"/>
-                </a:solidFill>
-              </a:rPr>
-              <a:t>	"</a:t>
-            </a:r>
-            <a:r>
-              <a:rPr lang="da-DK" sz="1600" dirty="0" smtClean="0">
-                <a:solidFill>
-                  <a:schemeClr val="bg1"/>
-                </a:solidFill>
-              </a:rPr>
-              <a:t>objectType": "note”,</a:t>
+              <a:t>			"objectType": "note”,</a:t>
             </a:r>
             <a:br>
               <a:rPr lang="da-DK" sz="1600" dirty="0" smtClean="0">
@@ -19940,23 +19758,7 @@
                   <a:schemeClr val="bg1"/>
                 </a:solidFill>
               </a:rPr>
-              <a:t>		</a:t>
-            </a:r>
-            <a:r>
-              <a:rPr lang="da-DK" sz="1600" dirty="0" smtClean="0">
-                <a:solidFill>
-                  <a:schemeClr val="bg1"/>
-                </a:solidFill>
-              </a:rPr>
-              <a:t>	"</a:t>
-            </a:r>
-            <a:r>
-              <a:rPr lang="da-DK" sz="1600" dirty="0" smtClean="0">
-                <a:solidFill>
-                  <a:schemeClr val="bg1"/>
-                </a:solidFill>
-              </a:rPr>
-              <a:t>id": "1234567890-1234567890-1234567890”</a:t>
+              <a:t>			"id": "1234567890-1234567890-1234567890”</a:t>
             </a:r>
             <a:br>
               <a:rPr lang="da-DK" sz="1600" dirty="0" smtClean="0">
@@ -21176,7 +20978,7 @@
       </p:grpSpPr>
       <p:sp>
         <p:nvSpPr>
-          <p:cNvPr id="2" name="Title 1"/>
+          <p:cNvPr id="2" name="Titel 1"/>
           <p:cNvSpPr>
             <a:spLocks noGrp="1"/>
           </p:cNvSpPr>
@@ -21186,14 +20988,12 @@
         </p:nvSpPr>
         <p:spPr/>
         <p:txBody>
-          <a:bodyPr>
-            <a:normAutofit/>
-          </a:bodyPr>
+          <a:bodyPr/>
           <a:lstStyle/>
           <a:p>
             <a:r>
               <a:rPr lang="da-DK" dirty="0" smtClean="0"/>
-              <a:t>Summary</a:t>
+              <a:t>Demo</a:t>
             </a:r>
             <a:endParaRPr lang="da-DK" dirty="0"/>
           </a:p>
@@ -21201,7 +21001,7 @@
       </p:sp>
       <p:sp>
         <p:nvSpPr>
-          <p:cNvPr id="3" name="Content Placeholder 2"/>
+          <p:cNvPr id="3" name="Pladsholder til indhold 2"/>
           <p:cNvSpPr>
             <a:spLocks noGrp="1"/>
           </p:cNvSpPr>
@@ -21211,81 +21011,109 @@
         </p:nvSpPr>
         <p:spPr/>
         <p:txBody>
-          <a:bodyPr>
-            <a:normAutofit/>
-          </a:bodyPr>
+          <a:bodyPr/>
           <a:lstStyle/>
           <a:p>
             <a:r>
-              <a:rPr lang="da-DK" dirty="0" smtClean="0"/>
-              <a:t>There’s no one stream - @me vs. @public vs. community</a:t>
-            </a:r>
-          </a:p>
-          <a:p>
-            <a:r>
-              <a:rPr lang="da-DK" dirty="0" smtClean="0"/>
-              <a:t>Be patient – wrapping your head around these concepts can be hard in the beginning</a:t>
-            </a:r>
-          </a:p>
-          <a:p>
-            <a:r>
-              <a:rPr lang="da-DK" dirty="0" smtClean="0"/>
-              <a:t>Remember that the data </a:t>
-            </a:r>
-            <a:r>
-              <a:rPr lang="da-DK" b="1" dirty="0" smtClean="0"/>
-              <a:t>isn’t stored in</a:t>
-            </a:r>
-            <a:r>
-              <a:rPr lang="da-DK" dirty="0" smtClean="0"/>
-              <a:t> the stream but rather is </a:t>
-            </a:r>
-            <a:r>
-              <a:rPr lang="da-DK" b="1" dirty="0" smtClean="0"/>
-              <a:t>pointed to from</a:t>
-            </a:r>
-            <a:r>
-              <a:rPr lang="da-DK" dirty="0" smtClean="0"/>
-              <a:t> the stream</a:t>
-            </a:r>
-          </a:p>
-          <a:p>
-            <a:r>
-              <a:rPr lang="da-DK" dirty="0" smtClean="0"/>
-              <a:t>Entries are automatically purged from the stream unless saved or marked actionable</a:t>
-            </a:r>
-          </a:p>
-          <a:p>
-            <a:r>
-              <a:rPr lang="da-DK" dirty="0" smtClean="0"/>
-              <a:t>You cannot delete from the stream (yet)</a:t>
-            </a:r>
-          </a:p>
-          <a:p>
-            <a:r>
-              <a:rPr lang="da-DK" dirty="0" smtClean="0"/>
-              <a:t>Accessed using REST API URL based on user, group, application and activity ID</a:t>
-            </a:r>
-          </a:p>
-          <a:p>
-            <a:r>
-              <a:rPr lang="da-DK" dirty="0" smtClean="0"/>
-              <a:t>When working with the RESTClient in Firefox use ”Private Browsing” mode as credentials used and cookies returned in one tab doesn’t leak to other ”Private Browsing” tabs.</a:t>
-            </a:r>
-          </a:p>
-          <a:p>
-            <a:r>
-              <a:rPr lang="da-DK" dirty="0" smtClean="0"/>
-              <a:t>Pretty easy to use once you grasp the concepts</a:t>
-            </a:r>
-            <a:endParaRPr lang="da-DK" dirty="0"/>
+              <a:rPr lang="da-DK" sz="2800" dirty="0" smtClean="0"/>
+              <a:t>Tweet’2’stream</a:t>
+            </a:r>
+          </a:p>
+          <a:p>
+            <a:pPr lvl="1"/>
+            <a:r>
+              <a:rPr lang="da-DK" sz="2800" dirty="0" err="1"/>
+              <a:t>https</a:t>
+            </a:r>
+            <a:r>
+              <a:rPr lang="da-DK" sz="2800" dirty="0"/>
+              <a:t>://</a:t>
+            </a:r>
+            <a:r>
+              <a:rPr lang="da-DK" sz="2800" dirty="0" err="1"/>
+              <a:t>github.com</a:t>
+            </a:r>
+            <a:r>
+              <a:rPr lang="da-DK" sz="2800" dirty="0"/>
+              <a:t>/</a:t>
+            </a:r>
+            <a:r>
+              <a:rPr lang="da-DK" sz="2800" dirty="0" err="1"/>
+              <a:t>lekkimworld</a:t>
+            </a:r>
+            <a:r>
+              <a:rPr lang="da-DK" sz="2800" dirty="0"/>
+              <a:t>/IC14_BP301</a:t>
+            </a:r>
+            <a:endParaRPr lang="da-DK" sz="2800" dirty="0" smtClean="0"/>
+          </a:p>
+          <a:p>
+            <a:r>
+              <a:rPr lang="da-DK" sz="2800" dirty="0" err="1" smtClean="0"/>
+              <a:t>Build</a:t>
+            </a:r>
+            <a:r>
+              <a:rPr lang="da-DK" sz="2800" dirty="0" smtClean="0"/>
+              <a:t> script integration</a:t>
+            </a:r>
+            <a:endParaRPr lang="da-DK" sz="2800" dirty="0"/>
           </a:p>
         </p:txBody>
       </p:sp>
+      <p:sp>
+        <p:nvSpPr>
+          <p:cNvPr id="4" name="Pladsholder til diasnummer 3"/>
+          <p:cNvSpPr>
+            <a:spLocks noGrp="1"/>
+          </p:cNvSpPr>
+          <p:nvPr>
+            <p:ph type="sldNum" sz="quarter" idx="10"/>
+          </p:nvPr>
+        </p:nvSpPr>
+        <p:spPr/>
+        <p:txBody>
+          <a:bodyPr/>
+          <a:lstStyle/>
+          <a:p>
+            <a:fld id="{3D445C38-D22E-BA41-8F78-BA3CF925B1F3}" type="slidenum">
+              <a:rPr lang="en-US" smtClean="0"/>
+              <a:pPr/>
+              <a:t>57</a:t>
+            </a:fld>
+            <a:endParaRPr lang="en-US"/>
+          </a:p>
+        </p:txBody>
+      </p:sp>
+      <p:pic>
+        <p:nvPicPr>
+          <p:cNvPr id="5" name="Picture 2" descr="http://www.gearsandstuff.com/images/gear_types/spur_gear.jpg"/>
+          <p:cNvPicPr>
+            <a:picLocks noChangeAspect="1" noChangeArrowheads="1"/>
+          </p:cNvPicPr>
+          <p:nvPr/>
+        </p:nvPicPr>
+        <p:blipFill>
+          <a:blip r:embed="rId2" cstate="print"/>
+          <a:srcRect/>
+          <a:stretch>
+            <a:fillRect/>
+          </a:stretch>
+        </p:blipFill>
+        <p:spPr bwMode="auto">
+          <a:xfrm>
+            <a:off x="5271749" y="2345851"/>
+            <a:ext cx="3028950" cy="2481177"/>
+          </a:xfrm>
+          <a:prstGeom prst="rect">
+            <a:avLst/>
+          </a:prstGeom>
+          <a:noFill/>
+        </p:spPr>
+      </p:pic>
     </p:spTree>
     <p:extLst>
       <p:ext uri="{BB962C8B-B14F-4D97-AF65-F5344CB8AC3E}">
-        <p14:creationId xmlns:p14="http://schemas.microsoft.com/office/powerpoint/2010/main" val="974939933"/>
+        <p14:creationId xmlns:p14="http://schemas.microsoft.com/office/powerpoint/2010/main" val="1687974324"/>
       </p:ext>
     </p:extLst>
   </p:cSld>
@@ -21321,7 +21149,7 @@
       </p:grpSpPr>
       <p:sp>
         <p:nvSpPr>
-          <p:cNvPr id="2" name="Title 1"/>
+          <p:cNvPr id="2" name="Titel 1"/>
           <p:cNvSpPr>
             <a:spLocks noGrp="1"/>
           </p:cNvSpPr>
@@ -21331,14 +21159,20 @@
         </p:nvSpPr>
         <p:spPr/>
         <p:txBody>
-          <a:bodyPr>
-            <a:normAutofit/>
-          </a:bodyPr>
+          <a:bodyPr/>
           <a:lstStyle/>
           <a:p>
             <a:r>
               <a:rPr lang="da-DK" dirty="0" smtClean="0"/>
-              <a:t>Resources</a:t>
+              <a:t>Demo – </a:t>
+            </a:r>
+            <a:r>
+              <a:rPr lang="da-DK" dirty="0" err="1" smtClean="0"/>
+              <a:t>safety</a:t>
+            </a:r>
+            <a:r>
+              <a:rPr lang="da-DK" dirty="0" smtClean="0"/>
+              <a:t> slide (1)</a:t>
             </a:r>
             <a:endParaRPr lang="da-DK" dirty="0"/>
           </a:p>
@@ -21346,72 +21180,56 @@
       </p:sp>
       <p:sp>
         <p:nvSpPr>
-          <p:cNvPr id="3" name="Content Placeholder 2"/>
+          <p:cNvPr id="4" name="Pladsholder til diasnummer 3"/>
           <p:cNvSpPr>
             <a:spLocks noGrp="1"/>
           </p:cNvSpPr>
           <p:nvPr>
-            <p:ph idx="1"/>
+            <p:ph type="sldNum" sz="quarter" idx="10"/>
           </p:nvPr>
         </p:nvSpPr>
         <p:spPr/>
         <p:txBody>
-          <a:bodyPr>
-            <a:noAutofit/>
-          </a:bodyPr>
+          <a:bodyPr/>
           <a:lstStyle/>
           <a:p>
-            <a:r>
-              <a:rPr lang="da-DK" sz="1800" dirty="0" smtClean="0"/>
-              <a:t>Activity Streams in the OpenSocial specification, </a:t>
-            </a:r>
-            <a:r>
-              <a:rPr lang="da-DK" sz="1800" dirty="0" smtClean="0">
-                <a:hlinkClick r:id="rId2"/>
-              </a:rPr>
-              <a:t>http://opensocial-resources.googlecode.com/svn/spec/trunk/Social-API-Server.xml#ActivityStreams-Service</a:t>
-            </a:r>
-            <a:endParaRPr lang="da-DK" sz="1800" dirty="0" smtClean="0"/>
-          </a:p>
-          <a:p>
-            <a:r>
-              <a:rPr lang="da-DK" sz="1800" dirty="0" smtClean="0"/>
-              <a:t>AppDev wiki, </a:t>
-            </a:r>
-            <a:r>
-              <a:rPr lang="da-DK" sz="1800" dirty="0" smtClean="0">
-                <a:hlinkClick r:id="rId3"/>
-              </a:rPr>
-              <a:t>http://www-10.lotus.com/ldd/appdevwiki.nsf</a:t>
-            </a:r>
-            <a:endParaRPr lang="da-DK" sz="1800" dirty="0" smtClean="0"/>
-          </a:p>
-          <a:p>
-            <a:r>
-              <a:rPr lang="da-DK" sz="1800" dirty="0" smtClean="0"/>
-              <a:t>IBM Connections Activity Stream Integration (AD104 from IBM Connect 2013), </a:t>
-            </a:r>
-            <a:r>
-              <a:rPr lang="da-DK" sz="1800" dirty="0" smtClean="0">
-                <a:hlinkClick r:id="rId4"/>
-              </a:rPr>
-              <a:t>http://www.slideshare.net/brianog/ad104-ibm-connections-actiivtystream-integration</a:t>
-            </a:r>
-            <a:endParaRPr lang="da-DK" sz="1800" dirty="0" smtClean="0"/>
-          </a:p>
-          <a:p>
-            <a:r>
-              <a:rPr lang="da-DK" sz="1800" dirty="0" smtClean="0"/>
-              <a:t>Activity Stream hands-on lab, http://www-10.lotus.com/ldd/appdevwiki.nsf/xsp/.ibmmodres/domino/OpenAttachment/ldd/appdevwiki.nsf/82567C415DF5243185257AEE00626F82/attach/5-sdk-workshop-activitystreams.pdf</a:t>
-            </a:r>
-            <a:endParaRPr lang="da-DK" sz="1800" dirty="0"/>
+            <a:fld id="{3D445C38-D22E-BA41-8F78-BA3CF925B1F3}" type="slidenum">
+              <a:rPr lang="en-US" smtClean="0"/>
+              <a:pPr/>
+              <a:t>58</a:t>
+            </a:fld>
+            <a:endParaRPr lang="en-US"/>
           </a:p>
         </p:txBody>
       </p:sp>
+      <p:pic>
+        <p:nvPicPr>
+          <p:cNvPr id="7" name="Billede 6"/>
+          <p:cNvPicPr>
+            <a:picLocks noChangeAspect="1"/>
+          </p:cNvPicPr>
+          <p:nvPr/>
+        </p:nvPicPr>
+        <p:blipFill>
+          <a:blip r:embed="rId2"/>
+          <a:stretch>
+            <a:fillRect/>
+          </a:stretch>
+        </p:blipFill>
+        <p:spPr>
+          <a:xfrm>
+            <a:off x="863236" y="774369"/>
+            <a:ext cx="7391107" cy="4068019"/>
+          </a:xfrm>
+          <a:prstGeom prst="rect">
+            <a:avLst/>
+          </a:prstGeom>
+        </p:spPr>
+      </p:pic>
     </p:spTree>
     <p:extLst>
       <p:ext uri="{BB962C8B-B14F-4D97-AF65-F5344CB8AC3E}">
-        <p14:creationId xmlns:p14="http://schemas.microsoft.com/office/powerpoint/2010/main" val="4134143810"/>
+        <p14:creationId xmlns:p14="http://schemas.microsoft.com/office/powerpoint/2010/main" val="3017711190"/>
       </p:ext>
     </p:extLst>
   </p:cSld>
@@ -21447,7 +21265,7 @@
       </p:grpSpPr>
       <p:sp>
         <p:nvSpPr>
-          <p:cNvPr id="2" name="Title 1"/>
+          <p:cNvPr id="2" name="Titel 1"/>
           <p:cNvSpPr>
             <a:spLocks noGrp="1"/>
           </p:cNvSpPr>
@@ -21457,14 +21275,20 @@
         </p:nvSpPr>
         <p:spPr/>
         <p:txBody>
-          <a:bodyPr>
-            <a:normAutofit/>
-          </a:bodyPr>
+          <a:bodyPr/>
           <a:lstStyle/>
           <a:p>
             <a:r>
               <a:rPr lang="da-DK" dirty="0" smtClean="0"/>
-              <a:t>Tools of the trade</a:t>
+              <a:t>Demo – </a:t>
+            </a:r>
+            <a:r>
+              <a:rPr lang="da-DK" dirty="0" err="1" smtClean="0"/>
+              <a:t>safety</a:t>
+            </a:r>
+            <a:r>
+              <a:rPr lang="da-DK" dirty="0" smtClean="0"/>
+              <a:t> slide (2)</a:t>
             </a:r>
             <a:endParaRPr lang="da-DK" dirty="0"/>
           </a:p>
@@ -21472,78 +21296,56 @@
       </p:sp>
       <p:sp>
         <p:nvSpPr>
-          <p:cNvPr id="3" name="Content Placeholder 2"/>
+          <p:cNvPr id="4" name="Pladsholder til diasnummer 3"/>
           <p:cNvSpPr>
             <a:spLocks noGrp="1"/>
           </p:cNvSpPr>
           <p:nvPr>
-            <p:ph idx="1"/>
+            <p:ph type="sldNum" sz="quarter" idx="10"/>
           </p:nvPr>
         </p:nvSpPr>
         <p:spPr/>
         <p:txBody>
-          <a:bodyPr>
-            <a:normAutofit/>
-          </a:bodyPr>
+          <a:bodyPr/>
           <a:lstStyle/>
           <a:p>
-            <a:r>
-              <a:rPr lang="da-DK" dirty="0" smtClean="0"/>
-              <a:t>RESTclient in Firefox (recommended), </a:t>
-            </a:r>
-            <a:r>
-              <a:rPr lang="da-DK" dirty="0" smtClean="0">
-                <a:hlinkClick r:id="rId2"/>
-              </a:rPr>
-              <a:t>https://addons.mozilla.org/da/firefox/addon/restclient/</a:t>
-            </a:r>
-            <a:endParaRPr lang="da-DK" dirty="0" smtClean="0"/>
-          </a:p>
-          <a:p>
-            <a:r>
-              <a:rPr lang="da-DK" dirty="0" smtClean="0"/>
-              <a:t>Advanced REST client in Chrome (issues with POSTs), </a:t>
-            </a:r>
-            <a:r>
-              <a:rPr lang="da-DK" dirty="0" smtClean="0">
-                <a:hlinkClick r:id="rId3"/>
-              </a:rPr>
-              <a:t>http://bit.ly/advancedrest</a:t>
-            </a:r>
-            <a:endParaRPr lang="da-DK" dirty="0" smtClean="0"/>
-          </a:p>
-          <a:p>
-            <a:r>
-              <a:rPr lang="da-DK" dirty="0" smtClean="0"/>
-              <a:t>cURL (for any imaginable operating system), </a:t>
-            </a:r>
-            <a:r>
-              <a:rPr lang="da-DK" dirty="0" smtClean="0">
-                <a:hlinkClick r:id="rId4"/>
-              </a:rPr>
-              <a:t>http://curl.haxx.se/</a:t>
-            </a:r>
-            <a:endParaRPr lang="da-DK" dirty="0" smtClean="0"/>
-          </a:p>
-          <a:p>
-            <a:r>
-              <a:rPr lang="da-DK" dirty="0" smtClean="0"/>
-              <a:t>Charles Web Proxy, </a:t>
-            </a:r>
-            <a:r>
-              <a:rPr lang="da-DK" dirty="0" smtClean="0">
-                <a:hlinkClick r:id="rId5"/>
-              </a:rPr>
-              <a:t>http://www.charlesproxy.com</a:t>
-            </a:r>
-            <a:endParaRPr lang="da-DK" dirty="0"/>
+            <a:fld id="{3D445C38-D22E-BA41-8F78-BA3CF925B1F3}" type="slidenum">
+              <a:rPr lang="en-US" smtClean="0"/>
+              <a:pPr/>
+              <a:t>59</a:t>
+            </a:fld>
+            <a:endParaRPr lang="en-US"/>
           </a:p>
         </p:txBody>
       </p:sp>
+      <p:pic>
+        <p:nvPicPr>
+          <p:cNvPr id="3" name="Billede 2"/>
+          <p:cNvPicPr>
+            <a:picLocks noChangeAspect="1"/>
+          </p:cNvPicPr>
+          <p:nvPr/>
+        </p:nvPicPr>
+        <p:blipFill>
+          <a:blip r:embed="rId2"/>
+          <a:stretch>
+            <a:fillRect/>
+          </a:stretch>
+        </p:blipFill>
+        <p:spPr>
+          <a:xfrm>
+            <a:off x="1466137" y="663982"/>
+            <a:ext cx="5924606" cy="4339732"/>
+          </a:xfrm>
+          <a:prstGeom prst="rect">
+            <a:avLst/>
+          </a:prstGeom>
+        </p:spPr>
+      </p:pic>
     </p:spTree>
     <p:extLst>
       <p:ext uri="{BB962C8B-B14F-4D97-AF65-F5344CB8AC3E}">
-        <p14:creationId xmlns:p14="http://schemas.microsoft.com/office/powerpoint/2010/main" val="4223377369"/>
+        <p14:creationId xmlns:p14="http://schemas.microsoft.com/office/powerpoint/2010/main" val="1321991959"/>
       </p:ext>
     </p:extLst>
   </p:cSld>
@@ -21770,6 +21572,409 @@
 </file>
 
 <file path=ppt/slides/slide60.xml><?xml version="1.0" encoding="utf-8"?>
+<p:sld xmlns:a="http://schemas.openxmlformats.org/drawingml/2006/main" xmlns:r="http://schemas.openxmlformats.org/officeDocument/2006/relationships" xmlns:p="http://schemas.openxmlformats.org/presentationml/2006/main">
+  <p:cSld>
+    <p:spTree>
+      <p:nvGrpSpPr>
+        <p:cNvPr id="1" name=""/>
+        <p:cNvGrpSpPr/>
+        <p:nvPr/>
+      </p:nvGrpSpPr>
+      <p:grpSpPr>
+        <a:xfrm>
+          <a:off x="0" y="0"/>
+          <a:ext cx="0" cy="0"/>
+          <a:chOff x="0" y="0"/>
+          <a:chExt cx="0" cy="0"/>
+        </a:xfrm>
+      </p:grpSpPr>
+      <p:sp>
+        <p:nvSpPr>
+          <p:cNvPr id="2" name="Title 1"/>
+          <p:cNvSpPr>
+            <a:spLocks noGrp="1"/>
+          </p:cNvSpPr>
+          <p:nvPr>
+            <p:ph type="title"/>
+          </p:nvPr>
+        </p:nvSpPr>
+        <p:spPr/>
+        <p:txBody>
+          <a:bodyPr>
+            <a:normAutofit/>
+          </a:bodyPr>
+          <a:lstStyle/>
+          <a:p>
+            <a:r>
+              <a:rPr lang="da-DK" dirty="0" smtClean="0"/>
+              <a:t>Summary</a:t>
+            </a:r>
+            <a:endParaRPr lang="da-DK" dirty="0"/>
+          </a:p>
+        </p:txBody>
+      </p:sp>
+      <p:sp>
+        <p:nvSpPr>
+          <p:cNvPr id="3" name="Content Placeholder 2"/>
+          <p:cNvSpPr>
+            <a:spLocks noGrp="1"/>
+          </p:cNvSpPr>
+          <p:nvPr>
+            <p:ph idx="1"/>
+          </p:nvPr>
+        </p:nvSpPr>
+        <p:spPr/>
+        <p:txBody>
+          <a:bodyPr>
+            <a:normAutofit/>
+          </a:bodyPr>
+          <a:lstStyle/>
+          <a:p>
+            <a:r>
+              <a:rPr lang="da-DK" dirty="0" smtClean="0"/>
+              <a:t>There’s no one stream - @me vs. @public vs. community</a:t>
+            </a:r>
+          </a:p>
+          <a:p>
+            <a:r>
+              <a:rPr lang="da-DK" dirty="0" smtClean="0"/>
+              <a:t>Be patient – wrapping your head around these concepts can be hard in the beginning</a:t>
+            </a:r>
+          </a:p>
+          <a:p>
+            <a:r>
+              <a:rPr lang="da-DK" dirty="0" smtClean="0"/>
+              <a:t>Remember that the data </a:t>
+            </a:r>
+            <a:r>
+              <a:rPr lang="da-DK" b="1" dirty="0" smtClean="0"/>
+              <a:t>isn’t stored in</a:t>
+            </a:r>
+            <a:r>
+              <a:rPr lang="da-DK" dirty="0" smtClean="0"/>
+              <a:t> the stream but rather is </a:t>
+            </a:r>
+            <a:r>
+              <a:rPr lang="da-DK" b="1" dirty="0" smtClean="0"/>
+              <a:t>pointed to from</a:t>
+            </a:r>
+            <a:r>
+              <a:rPr lang="da-DK" dirty="0" smtClean="0"/>
+              <a:t> the stream</a:t>
+            </a:r>
+          </a:p>
+          <a:p>
+            <a:r>
+              <a:rPr lang="da-DK" dirty="0" smtClean="0"/>
+              <a:t>Entries are automatically purged from the stream unless saved or marked actionable</a:t>
+            </a:r>
+          </a:p>
+          <a:p>
+            <a:r>
+              <a:rPr lang="da-DK" dirty="0" smtClean="0"/>
+              <a:t>You cannot delete from the stream (yet)</a:t>
+            </a:r>
+          </a:p>
+          <a:p>
+            <a:r>
+              <a:rPr lang="da-DK" dirty="0" smtClean="0"/>
+              <a:t>Accessed using REST API URL based on user, group, application and activity ID</a:t>
+            </a:r>
+          </a:p>
+          <a:p>
+            <a:r>
+              <a:rPr lang="da-DK" dirty="0" smtClean="0"/>
+              <a:t>When working with the RESTClient in Firefox use ”Private Browsing” mode as credentials used and cookies returned in one tab doesn’t leak to other ”Private Browsing” tabs.</a:t>
+            </a:r>
+          </a:p>
+          <a:p>
+            <a:r>
+              <a:rPr lang="da-DK" dirty="0" smtClean="0"/>
+              <a:t>Pretty easy to use once you grasp the concepts</a:t>
+            </a:r>
+            <a:endParaRPr lang="da-DK" dirty="0"/>
+          </a:p>
+        </p:txBody>
+      </p:sp>
+    </p:spTree>
+    <p:extLst>
+      <p:ext uri="{BB962C8B-B14F-4D97-AF65-F5344CB8AC3E}">
+        <p14:creationId xmlns:p14="http://schemas.microsoft.com/office/powerpoint/2010/main" val="974939933"/>
+      </p:ext>
+    </p:extLst>
+  </p:cSld>
+  <p:clrMapOvr>
+    <a:masterClrMapping/>
+  </p:clrMapOvr>
+  <p:timing>
+    <p:tnLst>
+      <p:par>
+        <p:cTn xmlns:p14="http://schemas.microsoft.com/office/powerpoint/2010/main" id="1" dur="indefinite" restart="never" nodeType="tmRoot"/>
+      </p:par>
+    </p:tnLst>
+  </p:timing>
+</p:sld>
+</file>
+
+<file path=ppt/slides/slide61.xml><?xml version="1.0" encoding="utf-8"?>
+<p:sld xmlns:a="http://schemas.openxmlformats.org/drawingml/2006/main" xmlns:r="http://schemas.openxmlformats.org/officeDocument/2006/relationships" xmlns:p="http://schemas.openxmlformats.org/presentationml/2006/main">
+  <p:cSld>
+    <p:spTree>
+      <p:nvGrpSpPr>
+        <p:cNvPr id="1" name=""/>
+        <p:cNvGrpSpPr/>
+        <p:nvPr/>
+      </p:nvGrpSpPr>
+      <p:grpSpPr>
+        <a:xfrm>
+          <a:off x="0" y="0"/>
+          <a:ext cx="0" cy="0"/>
+          <a:chOff x="0" y="0"/>
+          <a:chExt cx="0" cy="0"/>
+        </a:xfrm>
+      </p:grpSpPr>
+      <p:sp>
+        <p:nvSpPr>
+          <p:cNvPr id="2" name="Title 1"/>
+          <p:cNvSpPr>
+            <a:spLocks noGrp="1"/>
+          </p:cNvSpPr>
+          <p:nvPr>
+            <p:ph type="title"/>
+          </p:nvPr>
+        </p:nvSpPr>
+        <p:spPr/>
+        <p:txBody>
+          <a:bodyPr>
+            <a:normAutofit/>
+          </a:bodyPr>
+          <a:lstStyle/>
+          <a:p>
+            <a:r>
+              <a:rPr lang="da-DK" dirty="0" smtClean="0"/>
+              <a:t>Resources</a:t>
+            </a:r>
+            <a:endParaRPr lang="da-DK" dirty="0"/>
+          </a:p>
+        </p:txBody>
+      </p:sp>
+      <p:sp>
+        <p:nvSpPr>
+          <p:cNvPr id="3" name="Content Placeholder 2"/>
+          <p:cNvSpPr>
+            <a:spLocks noGrp="1"/>
+          </p:cNvSpPr>
+          <p:nvPr>
+            <p:ph idx="1"/>
+          </p:nvPr>
+        </p:nvSpPr>
+        <p:spPr/>
+        <p:txBody>
+          <a:bodyPr>
+            <a:noAutofit/>
+          </a:bodyPr>
+          <a:lstStyle/>
+          <a:p>
+            <a:r>
+              <a:rPr lang="da-DK" sz="1800" dirty="0" smtClean="0"/>
+              <a:t>Activity Streams in the OpenSocial specification, </a:t>
+            </a:r>
+            <a:r>
+              <a:rPr lang="da-DK" sz="1800" dirty="0" smtClean="0">
+                <a:hlinkClick r:id="rId2"/>
+              </a:rPr>
+              <a:t>http://opensocial-resources.googlecode.com/svn/spec/trunk/Social-API-Server.xml#ActivityStreams-Service</a:t>
+            </a:r>
+            <a:endParaRPr lang="da-DK" sz="1800" dirty="0" smtClean="0"/>
+          </a:p>
+          <a:p>
+            <a:r>
+              <a:rPr lang="da-DK" sz="1800" dirty="0" smtClean="0"/>
+              <a:t>AppDev wiki, </a:t>
+            </a:r>
+            <a:r>
+              <a:rPr lang="da-DK" sz="1800" dirty="0" smtClean="0">
+                <a:hlinkClick r:id="rId3"/>
+              </a:rPr>
+              <a:t>http://www-10.lotus.com/ldd/appdevwiki.nsf</a:t>
+            </a:r>
+            <a:endParaRPr lang="da-DK" sz="1800" dirty="0" smtClean="0"/>
+          </a:p>
+          <a:p>
+            <a:r>
+              <a:rPr lang="da-DK" sz="1800" dirty="0" smtClean="0"/>
+              <a:t>IBM Connections Activity Stream Integration (AD104 from IBM Connect 2013), </a:t>
+            </a:r>
+            <a:r>
+              <a:rPr lang="da-DK" sz="1800" dirty="0" smtClean="0">
+                <a:hlinkClick r:id="rId4"/>
+              </a:rPr>
+              <a:t>http://www.slideshare.net/brianog/ad104-ibm-connections-actiivtystream-integration</a:t>
+            </a:r>
+            <a:endParaRPr lang="da-DK" sz="1800" dirty="0" smtClean="0"/>
+          </a:p>
+          <a:p>
+            <a:r>
+              <a:rPr lang="da-DK" sz="1800" dirty="0" smtClean="0"/>
+              <a:t>Activity Stream hands-on lab, http://www-10.lotus.com/ldd/appdevwiki.nsf/xsp/.ibmmodres/domino/OpenAttachment/ldd/appdevwiki.nsf/82567C415DF5243185257AEE00626F82/attach/5-sdk-workshop-activitystreams.pdf</a:t>
+            </a:r>
+            <a:endParaRPr lang="da-DK" sz="1800" dirty="0"/>
+          </a:p>
+        </p:txBody>
+      </p:sp>
+    </p:spTree>
+    <p:extLst>
+      <p:ext uri="{BB962C8B-B14F-4D97-AF65-F5344CB8AC3E}">
+        <p14:creationId xmlns:p14="http://schemas.microsoft.com/office/powerpoint/2010/main" val="4134143810"/>
+      </p:ext>
+    </p:extLst>
+  </p:cSld>
+  <p:clrMapOvr>
+    <a:masterClrMapping/>
+  </p:clrMapOvr>
+  <p:timing>
+    <p:tnLst>
+      <p:par>
+        <p:cTn xmlns:p14="http://schemas.microsoft.com/office/powerpoint/2010/main" id="1" dur="indefinite" restart="never" nodeType="tmRoot"/>
+      </p:par>
+    </p:tnLst>
+  </p:timing>
+</p:sld>
+</file>
+
+<file path=ppt/slides/slide62.xml><?xml version="1.0" encoding="utf-8"?>
+<p:sld xmlns:a="http://schemas.openxmlformats.org/drawingml/2006/main" xmlns:r="http://schemas.openxmlformats.org/officeDocument/2006/relationships" xmlns:p="http://schemas.openxmlformats.org/presentationml/2006/main">
+  <p:cSld>
+    <p:spTree>
+      <p:nvGrpSpPr>
+        <p:cNvPr id="1" name=""/>
+        <p:cNvGrpSpPr/>
+        <p:nvPr/>
+      </p:nvGrpSpPr>
+      <p:grpSpPr>
+        <a:xfrm>
+          <a:off x="0" y="0"/>
+          <a:ext cx="0" cy="0"/>
+          <a:chOff x="0" y="0"/>
+          <a:chExt cx="0" cy="0"/>
+        </a:xfrm>
+      </p:grpSpPr>
+      <p:sp>
+        <p:nvSpPr>
+          <p:cNvPr id="2" name="Title 1"/>
+          <p:cNvSpPr>
+            <a:spLocks noGrp="1"/>
+          </p:cNvSpPr>
+          <p:nvPr>
+            <p:ph type="title"/>
+          </p:nvPr>
+        </p:nvSpPr>
+        <p:spPr/>
+        <p:txBody>
+          <a:bodyPr>
+            <a:normAutofit/>
+          </a:bodyPr>
+          <a:lstStyle/>
+          <a:p>
+            <a:r>
+              <a:rPr lang="da-DK" dirty="0" smtClean="0"/>
+              <a:t>Tools of the trade</a:t>
+            </a:r>
+            <a:endParaRPr lang="da-DK" dirty="0"/>
+          </a:p>
+        </p:txBody>
+      </p:sp>
+      <p:sp>
+        <p:nvSpPr>
+          <p:cNvPr id="3" name="Content Placeholder 2"/>
+          <p:cNvSpPr>
+            <a:spLocks noGrp="1"/>
+          </p:cNvSpPr>
+          <p:nvPr>
+            <p:ph idx="1"/>
+          </p:nvPr>
+        </p:nvSpPr>
+        <p:spPr/>
+        <p:txBody>
+          <a:bodyPr>
+            <a:normAutofit/>
+          </a:bodyPr>
+          <a:lstStyle/>
+          <a:p>
+            <a:r>
+              <a:rPr lang="da-DK" dirty="0" smtClean="0"/>
+              <a:t>RESTclient in Firefox (recommended), </a:t>
+            </a:r>
+            <a:r>
+              <a:rPr lang="da-DK" dirty="0" smtClean="0">
+                <a:hlinkClick r:id="rId2"/>
+              </a:rPr>
+              <a:t>https://addons.mozilla.org/da/firefox/addon/restclient/</a:t>
+            </a:r>
+            <a:endParaRPr lang="da-DK" dirty="0" smtClean="0"/>
+          </a:p>
+          <a:p>
+            <a:r>
+              <a:rPr lang="da-DK" dirty="0" smtClean="0"/>
+              <a:t>Advanced REST client in Chrome (issues with POSTs), </a:t>
+            </a:r>
+            <a:r>
+              <a:rPr lang="da-DK" dirty="0" smtClean="0">
+                <a:hlinkClick r:id="rId3"/>
+              </a:rPr>
+              <a:t>http://bit.ly/advancedrest</a:t>
+            </a:r>
+            <a:endParaRPr lang="da-DK" dirty="0" smtClean="0"/>
+          </a:p>
+          <a:p>
+            <a:r>
+              <a:rPr lang="da-DK" dirty="0" smtClean="0"/>
+              <a:t>cURL (for any imaginable operating system), </a:t>
+            </a:r>
+            <a:r>
+              <a:rPr lang="da-DK" dirty="0" smtClean="0">
+                <a:hlinkClick r:id="rId4"/>
+              </a:rPr>
+              <a:t>http://curl.haxx.se/</a:t>
+            </a:r>
+            <a:endParaRPr lang="da-DK" dirty="0" smtClean="0"/>
+          </a:p>
+          <a:p>
+            <a:r>
+              <a:rPr lang="da-DK" dirty="0" smtClean="0"/>
+              <a:t>Charles Web Proxy, </a:t>
+            </a:r>
+            <a:r>
+              <a:rPr lang="da-DK" dirty="0" smtClean="0">
+                <a:hlinkClick r:id="rId5"/>
+              </a:rPr>
+              <a:t>http://www.charlesproxy.com</a:t>
+            </a:r>
+            <a:endParaRPr lang="da-DK" dirty="0"/>
+          </a:p>
+        </p:txBody>
+      </p:sp>
+    </p:spTree>
+    <p:extLst>
+      <p:ext uri="{BB962C8B-B14F-4D97-AF65-F5344CB8AC3E}">
+        <p14:creationId xmlns:p14="http://schemas.microsoft.com/office/powerpoint/2010/main" val="4223377369"/>
+      </p:ext>
+    </p:extLst>
+  </p:cSld>
+  <p:clrMapOvr>
+    <a:masterClrMapping/>
+  </p:clrMapOvr>
+  <p:timing>
+    <p:tnLst>
+      <p:par>
+        <p:cTn xmlns:p14="http://schemas.microsoft.com/office/powerpoint/2010/main" id="1" dur="indefinite" restart="never" nodeType="tmRoot"/>
+      </p:par>
+    </p:tnLst>
+  </p:timing>
+</p:sld>
+</file>
+
+<file path=ppt/slides/slide63.xml><?xml version="1.0" encoding="utf-8"?>
 <p:sld xmlns:a="http://schemas.openxmlformats.org/drawingml/2006/main" xmlns:r="http://schemas.openxmlformats.org/officeDocument/2006/relationships" xmlns:p="http://schemas.openxmlformats.org/presentationml/2006/main">
   <p:cSld>
     <p:spTree>

</xml_diff>